<commit_message>
pictures of aliens separately
</commit_message>
<xml_diff>
--- a/img/stimuli.pptx
+++ b/img/stimuli.pptx
@@ -8,7 +8,8 @@
     <p:sldId id="256" r:id="rId2"/>
     <p:sldId id="257" r:id="rId3"/>
     <p:sldId id="258" r:id="rId4"/>
-    <p:sldId id="259" r:id="rId5"/>
+    <p:sldId id="260" r:id="rId5"/>
+    <p:sldId id="259" r:id="rId6"/>
   </p:sldIdLst>
   <p:sldSz cx="12192000" cy="6858000"/>
   <p:notesSz cx="6858000" cy="9144000"/>
@@ -246,7 +247,7 @@
           <a:p>
             <a:fld id="{309E3043-B2E7-4C6F-A344-AECB260FA6C5}" type="datetimeFigureOut">
               <a:rPr lang="en-US" smtClean="0"/>
-              <a:t>6/29/2017</a:t>
+              <a:t>7/8/2017</a:t>
             </a:fld>
             <a:endParaRPr lang="en-US"/>
           </a:p>
@@ -416,7 +417,7 @@
           <a:p>
             <a:fld id="{309E3043-B2E7-4C6F-A344-AECB260FA6C5}" type="datetimeFigureOut">
               <a:rPr lang="en-US" smtClean="0"/>
-              <a:t>6/29/2017</a:t>
+              <a:t>7/8/2017</a:t>
             </a:fld>
             <a:endParaRPr lang="en-US"/>
           </a:p>
@@ -596,7 +597,7 @@
           <a:p>
             <a:fld id="{309E3043-B2E7-4C6F-A344-AECB260FA6C5}" type="datetimeFigureOut">
               <a:rPr lang="en-US" smtClean="0"/>
-              <a:t>6/29/2017</a:t>
+              <a:t>7/8/2017</a:t>
             </a:fld>
             <a:endParaRPr lang="en-US"/>
           </a:p>
@@ -766,7 +767,7 @@
           <a:p>
             <a:fld id="{309E3043-B2E7-4C6F-A344-AECB260FA6C5}" type="datetimeFigureOut">
               <a:rPr lang="en-US" smtClean="0"/>
-              <a:t>6/29/2017</a:t>
+              <a:t>7/8/2017</a:t>
             </a:fld>
             <a:endParaRPr lang="en-US"/>
           </a:p>
@@ -1012,7 +1013,7 @@
           <a:p>
             <a:fld id="{309E3043-B2E7-4C6F-A344-AECB260FA6C5}" type="datetimeFigureOut">
               <a:rPr lang="en-US" smtClean="0"/>
-              <a:t>6/29/2017</a:t>
+              <a:t>7/8/2017</a:t>
             </a:fld>
             <a:endParaRPr lang="en-US"/>
           </a:p>
@@ -1244,7 +1245,7 @@
           <a:p>
             <a:fld id="{309E3043-B2E7-4C6F-A344-AECB260FA6C5}" type="datetimeFigureOut">
               <a:rPr lang="en-US" smtClean="0"/>
-              <a:t>6/29/2017</a:t>
+              <a:t>7/8/2017</a:t>
             </a:fld>
             <a:endParaRPr lang="en-US"/>
           </a:p>
@@ -1611,7 +1612,7 @@
           <a:p>
             <a:fld id="{309E3043-B2E7-4C6F-A344-AECB260FA6C5}" type="datetimeFigureOut">
               <a:rPr lang="en-US" smtClean="0"/>
-              <a:t>6/29/2017</a:t>
+              <a:t>7/8/2017</a:t>
             </a:fld>
             <a:endParaRPr lang="en-US"/>
           </a:p>
@@ -1729,7 +1730,7 @@
           <a:p>
             <a:fld id="{309E3043-B2E7-4C6F-A344-AECB260FA6C5}" type="datetimeFigureOut">
               <a:rPr lang="en-US" smtClean="0"/>
-              <a:t>6/29/2017</a:t>
+              <a:t>7/8/2017</a:t>
             </a:fld>
             <a:endParaRPr lang="en-US"/>
           </a:p>
@@ -1824,7 +1825,7 @@
           <a:p>
             <a:fld id="{309E3043-B2E7-4C6F-A344-AECB260FA6C5}" type="datetimeFigureOut">
               <a:rPr lang="en-US" smtClean="0"/>
-              <a:t>6/29/2017</a:t>
+              <a:t>7/8/2017</a:t>
             </a:fld>
             <a:endParaRPr lang="en-US"/>
           </a:p>
@@ -2101,7 +2102,7 @@
           <a:p>
             <a:fld id="{309E3043-B2E7-4C6F-A344-AECB260FA6C5}" type="datetimeFigureOut">
               <a:rPr lang="en-US" smtClean="0"/>
-              <a:t>6/29/2017</a:t>
+              <a:t>7/8/2017</a:t>
             </a:fld>
             <a:endParaRPr lang="en-US"/>
           </a:p>
@@ -2354,7 +2355,7 @@
           <a:p>
             <a:fld id="{309E3043-B2E7-4C6F-A344-AECB260FA6C5}" type="datetimeFigureOut">
               <a:rPr lang="en-US" smtClean="0"/>
-              <a:t>6/29/2017</a:t>
+              <a:t>7/8/2017</a:t>
             </a:fld>
             <a:endParaRPr lang="en-US"/>
           </a:p>
@@ -2567,7 +2568,7 @@
           <a:p>
             <a:fld id="{309E3043-B2E7-4C6F-A344-AECB260FA6C5}" type="datetimeFigureOut">
               <a:rPr lang="en-US" smtClean="0"/>
-              <a:t>6/29/2017</a:t>
+              <a:t>7/8/2017</a:t>
             </a:fld>
             <a:endParaRPr lang="en-US"/>
           </a:p>
@@ -4275,61 +4276,6 @@
           </a:extLst>
         </p:spPr>
       </p:pic>
-      <p:pic>
-        <p:nvPicPr>
-          <p:cNvPr id="8" name="Picture 7"/>
-          <p:cNvPicPr>
-            <a:picLocks noChangeAspect="1"/>
-          </p:cNvPicPr>
-          <p:nvPr/>
-        </p:nvPicPr>
-        <p:blipFill>
-          <a:blip r:embed="rId12">
-            <a:extLst>
-              <a:ext uri="{BEBA8EAE-BF5A-486C-A8C5-ECC9F3942E4B}">
-                <a14:imgProps xmlns:a14="http://schemas.microsoft.com/office/drawing/2010/main">
-                  <a14:imgLayer r:embed="rId13">
-                    <a14:imgEffect>
-                      <a14:backgroundRemoval t="0" b="100000" l="0" r="100000">
-                        <a14:foregroundMark x1="15134" y1="21103" x2="8544" y2="90887"/>
-                        <a14:foregroundMark x1="19284" y1="15108" x2="18633" y2="12710"/>
-                        <a14:foregroundMark x1="80960" y1="8153" x2="93247" y2="96163"/>
-                        <a14:foregroundMark x1="92758" y1="8873" x2="95443" y2="19904"/>
-                        <a14:foregroundMark x1="82587" y1="37410" x2="82669" y2="95923"/>
-                        <a14:foregroundMark x1="14727" y1="90887" x2="20504" y2="60432"/>
-                        <a14:foregroundMark x1="23515" y1="77938" x2="27258" y2="72662"/>
-                        <a14:foregroundMark x1="10496" y1="11271" x2="13019" y2="17986"/>
-                        <a14:foregroundMark x1="84459" y1="44604" x2="92758" y2="42926"/>
-                        <a14:foregroundMark x1="7404" y1="78897" x2="2604" y2="87530"/>
-                        <a14:foregroundMark x1="4963" y1="79856" x2="895" y2="70264"/>
-                        <a14:foregroundMark x1="9439" y1="19424" x2="12042" y2="22062"/>
-                        <a14:foregroundMark x1="44345" y1="46283" x2="59886" y2="44604"/>
-                        <a14:foregroundMark x1="92433" y1="38129" x2="97966" y2="78657"/>
-                        <a14:foregroundMark x1="14890" y1="18705" x2="13751" y2="8633"/>
-                      </a14:backgroundRemoval>
-                    </a14:imgEffect>
-                  </a14:imgLayer>
-                </a14:imgProps>
-              </a:ext>
-              <a:ext uri="{28A0092B-C50C-407E-A947-70E740481C1C}">
-                <a14:useLocalDpi xmlns:a14="http://schemas.microsoft.com/office/drawing/2010/main" val="0"/>
-              </a:ext>
-            </a:extLst>
-          </a:blip>
-          <a:stretch>
-            <a:fillRect/>
-          </a:stretch>
-        </p:blipFill>
-        <p:spPr>
-          <a:xfrm>
-            <a:off x="-631093" y="4204064"/>
-            <a:ext cx="11704762" cy="3971429"/>
-          </a:xfrm>
-          <a:prstGeom prst="rect">
-            <a:avLst/>
-          </a:prstGeom>
-        </p:spPr>
-      </p:pic>
       <p:grpSp>
         <p:nvGrpSpPr>
           <p:cNvPr id="5" name="Group 4"/>
@@ -4353,11 +4299,11 @@
             <p:nvPr/>
           </p:nvPicPr>
           <p:blipFill>
-            <a:blip r:embed="rId14">
+            <a:blip r:embed="rId12">
               <a:extLst>
                 <a:ext uri="{BEBA8EAE-BF5A-486C-A8C5-ECC9F3942E4B}">
                   <a14:imgProps xmlns:a14="http://schemas.microsoft.com/office/drawing/2010/main">
-                    <a14:imgLayer r:embed="rId15">
+                    <a14:imgLayer r:embed="rId13">
                       <a14:imgEffect>
                         <a14:backgroundRemoval t="0" b="100000" l="0" r="100000">
                           <a14:backgroundMark x1="89103" y1="80583" x2="91667" y2="85437"/>
@@ -4455,11 +4401,11 @@
             <p:nvPr/>
           </p:nvPicPr>
           <p:blipFill>
-            <a:blip r:embed="rId16">
+            <a:blip r:embed="rId14">
               <a:extLst>
                 <a:ext uri="{BEBA8EAE-BF5A-486C-A8C5-ECC9F3942E4B}">
                   <a14:imgProps xmlns:a14="http://schemas.microsoft.com/office/drawing/2010/main">
-                    <a14:imgLayer r:embed="rId17">
+                    <a14:imgLayer r:embed="rId15">
                       <a14:imgEffect>
                         <a14:backgroundRemoval t="0" b="63559" l="0" r="52695"/>
                       </a14:imgEffect>
@@ -4534,20 +4480,104 @@
           </p:txBody>
         </p:sp>
       </p:grpSp>
+    </p:spTree>
+    <p:extLst>
+      <p:ext uri="{BB962C8B-B14F-4D97-AF65-F5344CB8AC3E}">
+        <p14:creationId xmlns:p14="http://schemas.microsoft.com/office/powerpoint/2010/main" val="3941721566"/>
+      </p:ext>
+    </p:extLst>
+  </p:cSld>
+  <p:clrMapOvr>
+    <a:masterClrMapping/>
+  </p:clrMapOvr>
+</p:sld>
+</file>
+
+<file path=ppt/slides/slide4.xml><?xml version="1.0" encoding="utf-8"?>
+<p:sld xmlns:a="http://schemas.openxmlformats.org/drawingml/2006/main" xmlns:r="http://schemas.openxmlformats.org/officeDocument/2006/relationships" xmlns:p="http://schemas.openxmlformats.org/presentationml/2006/main">
+  <p:cSld>
+    <p:spTree>
+      <p:nvGrpSpPr>
+        <p:cNvPr id="1" name=""/>
+        <p:cNvGrpSpPr/>
+        <p:nvPr/>
+      </p:nvGrpSpPr>
+      <p:grpSpPr>
+        <a:xfrm>
+          <a:off x="0" y="0"/>
+          <a:ext cx="0" cy="0"/>
+          <a:chOff x="0" y="0"/>
+          <a:chExt cx="0" cy="0"/>
+        </a:xfrm>
+      </p:grpSpPr>
       <p:pic>
         <p:nvPicPr>
-          <p:cNvPr id="10" name="Picture 9"/>
+          <p:cNvPr id="4" name="Picture 3"/>
           <p:cNvPicPr>
             <a:picLocks noChangeAspect="1"/>
           </p:cNvPicPr>
           <p:nvPr/>
         </p:nvPicPr>
         <p:blipFill rotWithShape="1">
-          <a:blip r:embed="rId18" cstate="print">
+          <a:blip r:embed="rId2">
             <a:extLst>
               <a:ext uri="{BEBA8EAE-BF5A-486C-A8C5-ECC9F3942E4B}">
                 <a14:imgProps xmlns:a14="http://schemas.microsoft.com/office/drawing/2010/main">
-                  <a14:imgLayer r:embed="rId19">
+                  <a14:imgLayer r:embed="rId3">
+                    <a14:imgEffect>
+                      <a14:backgroundRemoval t="0" b="100000" l="0" r="100000">
+                        <a14:foregroundMark x1="15134" y1="21103" x2="8544" y2="90887"/>
+                        <a14:foregroundMark x1="19284" y1="15108" x2="18633" y2="12710"/>
+                        <a14:foregroundMark x1="80960" y1="8153" x2="93247" y2="96163"/>
+                        <a14:foregroundMark x1="92758" y1="8873" x2="95443" y2="19904"/>
+                        <a14:foregroundMark x1="82587" y1="37410" x2="82669" y2="95923"/>
+                        <a14:foregroundMark x1="14727" y1="90887" x2="20504" y2="60432"/>
+                        <a14:foregroundMark x1="23515" y1="77938" x2="27258" y2="72662"/>
+                        <a14:foregroundMark x1="10496" y1="11271" x2="13019" y2="17986"/>
+                        <a14:foregroundMark x1="84459" y1="44604" x2="92758" y2="42926"/>
+                        <a14:foregroundMark x1="7404" y1="78897" x2="2604" y2="87530"/>
+                        <a14:foregroundMark x1="4963" y1="79856" x2="895" y2="70264"/>
+                        <a14:foregroundMark x1="9439" y1="19424" x2="12042" y2="22062"/>
+                        <a14:foregroundMark x1="44345" y1="46283" x2="59886" y2="44604"/>
+                        <a14:foregroundMark x1="92433" y1="38129" x2="97966" y2="78657"/>
+                        <a14:foregroundMark x1="14890" y1="18705" x2="13751" y2="8633"/>
+                      </a14:backgroundRemoval>
+                    </a14:imgEffect>
+                  </a14:imgLayer>
+                </a14:imgProps>
+              </a:ext>
+              <a:ext uri="{28A0092B-C50C-407E-A947-70E740481C1C}">
+                <a14:useLocalDpi xmlns:a14="http://schemas.microsoft.com/office/drawing/2010/main" val="0"/>
+              </a:ext>
+            </a:extLst>
+          </a:blip>
+          <a:srcRect l="70404" t="1328" r="-4287" b="-1328"/>
+          <a:stretch/>
+        </p:blipFill>
+        <p:spPr>
+          <a:xfrm>
+            <a:off x="843573" y="314324"/>
+            <a:ext cx="3965819" cy="3971429"/>
+          </a:xfrm>
+          <a:prstGeom prst="rect">
+            <a:avLst/>
+          </a:prstGeom>
+        </p:spPr>
+      </p:pic>
+      <p:pic>
+        <p:nvPicPr>
+          <p:cNvPr id="5" name="Picture 4"/>
+          <p:cNvPicPr>
+            <a:picLocks noChangeAspect="1"/>
+          </p:cNvPicPr>
+          <p:nvPr/>
+        </p:nvPicPr>
+        <p:blipFill rotWithShape="1">
+          <a:blip r:embed="rId4" cstate="print">
+            <a:extLst>
+              <a:ext uri="{BEBA8EAE-BF5A-486C-A8C5-ECC9F3942E4B}">
+                <a14:imgProps xmlns:a14="http://schemas.microsoft.com/office/drawing/2010/main">
+                  <a14:imgLayer r:embed="rId5">
                     <a14:imgEffect>
                       <a14:backgroundRemoval t="60614" b="88491" l="6091" r="94727">
                         <a14:foregroundMark x1="11273" y1="64706" x2="24455" y2="85081"/>
@@ -4572,7 +4602,7 @@
         </p:blipFill>
         <p:spPr>
           <a:xfrm>
-            <a:off x="2577380" y="2532918"/>
+            <a:off x="4652520" y="3181181"/>
             <a:ext cx="5838825" cy="1866573"/>
           </a:xfrm>
           <a:prstGeom prst="rect">
@@ -4583,7 +4613,7 @@
     </p:spTree>
     <p:extLst>
       <p:ext uri="{BB962C8B-B14F-4D97-AF65-F5344CB8AC3E}">
-        <p14:creationId xmlns:p14="http://schemas.microsoft.com/office/powerpoint/2010/main" val="3941721566"/>
+        <p14:creationId xmlns:p14="http://schemas.microsoft.com/office/powerpoint/2010/main" val="2237010920"/>
       </p:ext>
     </p:extLst>
   </p:cSld>
@@ -4593,7 +4623,7 @@
 </p:sld>
 </file>
 
-<file path=ppt/slides/slide4.xml><?xml version="1.0" encoding="utf-8"?>
+<file path=ppt/slides/slide5.xml><?xml version="1.0" encoding="utf-8"?>
 <p:sld xmlns:a="http://schemas.openxmlformats.org/drawingml/2006/main" xmlns:r="http://schemas.openxmlformats.org/officeDocument/2006/relationships" xmlns:p="http://schemas.openxmlformats.org/presentationml/2006/main">
   <p:cSld>
     <p:spTree>

</xml_diff>